<commit_message>
tilføjet to slides til PPT
</commit_message>
<xml_diff>
--- a/PPT-present.pptx
+++ b/PPT-present.pptx
@@ -272,6 +272,11 @@
       </a:defRPr>
     </a:lvl9pPr>
   </p:defaultTextStyle>
+  <p:extLst>
+    <p:ext uri="{EFAFB233-063F-42B5-8137-9DF3F51BA10A}">
+      <p15:sldGuideLst xmlns:p15="http://schemas.microsoft.com/office/powerpoint/2012/main"/>
+    </p:ext>
+  </p:extLst>
 </p:presentation>
 </file>
 
@@ -279,8 +284,77 @@
 <p1510:revInfo xmlns:a="http://schemas.openxmlformats.org/drawingml/2006/main" xmlns:r="http://schemas.openxmlformats.org/officeDocument/2006/relationships" xmlns:p1510="http://schemas.microsoft.com/office/powerpoint/2015/10/main">
   <p1510:revLst>
     <p1510:client id="{BBB631A0-15CB-4556-BCAD-DAC4EF36B019}" v="1262" dt="2018-05-05T14:33:40.456"/>
+    <p1510:client id="{2DEA44CF-2ECD-468A-90D9-9874EB8A28AD}" v="759" dt="2018-05-05T14:47:55.465"/>
   </p1510:revLst>
 </p1510:revInfo>
+</file>
+
+<file path=ppt/changesInfos/changesInfo1.xml><?xml version="1.0" encoding="utf-8"?>
+<pc:chgInfo xmlns:a="http://schemas.openxmlformats.org/drawingml/2006/main" xmlns:r="http://schemas.openxmlformats.org/officeDocument/2006/relationships" xmlns:ac="http://schemas.microsoft.com/office/drawing/2013/main/command" xmlns:pc="http://schemas.microsoft.com/office/powerpoint/2013/main/command">
+  <pc:docChgLst>
+    <pc:chgData name="Jonas Philip Christensen" userId="706a573eaf568495" providerId="LiveId" clId="{2DEA44CF-2ECD-468A-90D9-9874EB8A28AD}"/>
+    <pc:docChg chg="custSel modSld">
+      <pc:chgData name="Jonas Philip Christensen" userId="706a573eaf568495" providerId="LiveId" clId="{2DEA44CF-2ECD-468A-90D9-9874EB8A28AD}" dt="2018-05-05T14:47:55.465" v="758" actId="20577"/>
+      <pc:docMkLst>
+        <pc:docMk/>
+      </pc:docMkLst>
+      <pc:sldChg chg="modSp">
+        <pc:chgData name="Jonas Philip Christensen" userId="706a573eaf568495" providerId="LiveId" clId="{2DEA44CF-2ECD-468A-90D9-9874EB8A28AD}" dt="2018-05-05T14:47:55.465" v="758" actId="20577"/>
+        <pc:sldMkLst>
+          <pc:docMk/>
+          <pc:sldMk cId="1046840352" sldId="287"/>
+        </pc:sldMkLst>
+        <pc:spChg chg="mod">
+          <ac:chgData name="Jonas Philip Christensen" userId="706a573eaf568495" providerId="LiveId" clId="{2DEA44CF-2ECD-468A-90D9-9874EB8A28AD}" dt="2018-05-05T14:47:10.005" v="638" actId="20577"/>
+          <ac:spMkLst>
+            <pc:docMk/>
+            <pc:sldMk cId="1046840352" sldId="287"/>
+            <ac:spMk id="3" creationId="{BB3B4471-4F21-47E7-B7C0-8BEB96F74E34}"/>
+          </ac:spMkLst>
+        </pc:spChg>
+        <pc:spChg chg="mod">
+          <ac:chgData name="Jonas Philip Christensen" userId="706a573eaf568495" providerId="LiveId" clId="{2DEA44CF-2ECD-468A-90D9-9874EB8A28AD}" dt="2018-05-05T14:47:36.640" v="705" actId="20577"/>
+          <ac:spMkLst>
+            <pc:docMk/>
+            <pc:sldMk cId="1046840352" sldId="287"/>
+            <ac:spMk id="4" creationId="{7EEF2A49-CD8B-4EEE-9D01-5E4C364A1DBD}"/>
+          </ac:spMkLst>
+        </pc:spChg>
+        <pc:spChg chg="mod">
+          <ac:chgData name="Jonas Philip Christensen" userId="706a573eaf568495" providerId="LiveId" clId="{2DEA44CF-2ECD-468A-90D9-9874EB8A28AD}" dt="2018-05-05T14:47:55.465" v="758" actId="20577"/>
+          <ac:spMkLst>
+            <pc:docMk/>
+            <pc:sldMk cId="1046840352" sldId="287"/>
+            <ac:spMk id="5" creationId="{BB70A0F9-5D42-4F5A-82BD-964C92C683A3}"/>
+          </ac:spMkLst>
+        </pc:spChg>
+      </pc:sldChg>
+      <pc:sldChg chg="modSp">
+        <pc:chgData name="Jonas Philip Christensen" userId="706a573eaf568495" providerId="LiveId" clId="{2DEA44CF-2ECD-468A-90D9-9874EB8A28AD}" dt="2018-05-05T14:46:03.694" v="508"/>
+        <pc:sldMkLst>
+          <pc:docMk/>
+          <pc:sldMk cId="1183978029" sldId="290"/>
+        </pc:sldMkLst>
+        <pc:spChg chg="mod">
+          <ac:chgData name="Jonas Philip Christensen" userId="706a573eaf568495" providerId="LiveId" clId="{2DEA44CF-2ECD-468A-90D9-9874EB8A28AD}" dt="2018-05-05T14:46:02.320" v="507"/>
+          <ac:spMkLst>
+            <pc:docMk/>
+            <pc:sldMk cId="1183978029" sldId="290"/>
+            <ac:spMk id="3" creationId="{8F5E6900-E11F-4757-8CDF-091B0A968D78}"/>
+          </ac:spMkLst>
+        </pc:spChg>
+        <pc:spChg chg="mod">
+          <ac:chgData name="Jonas Philip Christensen" userId="706a573eaf568495" providerId="LiveId" clId="{2DEA44CF-2ECD-468A-90D9-9874EB8A28AD}" dt="2018-05-05T14:46:03.694" v="508"/>
+          <ac:spMkLst>
+            <pc:docMk/>
+            <pc:sldMk cId="1183978029" sldId="290"/>
+            <ac:spMk id="4" creationId="{9AD5254C-2449-4BD5-B522-0AFC600254AE}"/>
+          </ac:spMkLst>
+        </pc:spChg>
+      </pc:sldChg>
+    </pc:docChg>
+  </pc:docChgLst>
+</pc:chgInfo>
 </file>
 
 <file path=ppt/notesMasters/notesMaster1.xml><?xml version="1.0" encoding="utf-8"?>
@@ -56398,7 +56472,26 @@
           <a:bodyPr/>
           <a:lstStyle/>
           <a:p>
-            <a:endParaRPr lang="da-DK" dirty="0"/>
+            <a:r>
+              <a:rPr lang="da-DK" dirty="0"/>
+              <a:t>1)</a:t>
+            </a:r>
+          </a:p>
+          <a:p>
+            <a:r>
+              <a:rPr lang="da-DK" dirty="0"/>
+              <a:t>Basics of Machine Learning</a:t>
+            </a:r>
+          </a:p>
+          <a:p>
+            <a:r>
+              <a:rPr lang="da-DK" dirty="0" err="1"/>
+              <a:t>What</a:t>
+            </a:r>
+            <a:r>
+              <a:rPr lang="da-DK" dirty="0"/>
+              <a:t> is Deep learning?</a:t>
+            </a:r>
           </a:p>
         </p:txBody>
       </p:sp>
@@ -56423,7 +56516,38 @@
           <a:bodyPr/>
           <a:lstStyle/>
           <a:p>
-            <a:endParaRPr lang="da-DK"/>
+            <a:r>
+              <a:rPr lang="da-DK" dirty="0"/>
+              <a:t>2)</a:t>
+            </a:r>
+          </a:p>
+          <a:p>
+            <a:r>
+              <a:rPr lang="da-DK" dirty="0"/>
+              <a:t>Data </a:t>
+            </a:r>
+            <a:r>
+              <a:rPr lang="da-DK" dirty="0" err="1"/>
+              <a:t>sources</a:t>
+            </a:r>
+            <a:endParaRPr lang="da-DK" dirty="0"/>
+          </a:p>
+          <a:p>
+            <a:r>
+              <a:rPr lang="da-DK" dirty="0"/>
+              <a:t>Data </a:t>
+            </a:r>
+            <a:r>
+              <a:rPr lang="da-DK" dirty="0" err="1"/>
+              <a:t>collection</a:t>
+            </a:r>
+            <a:endParaRPr lang="da-DK" dirty="0"/>
+          </a:p>
+          <a:p>
+            <a:r>
+              <a:rPr lang="da-DK" dirty="0"/>
+              <a:t>Data manipulation</a:t>
+            </a:r>
           </a:p>
         </p:txBody>
       </p:sp>
@@ -56448,7 +56572,29 @@
           <a:bodyPr/>
           <a:lstStyle/>
           <a:p>
-            <a:endParaRPr lang="da-DK"/>
+            <a:r>
+              <a:rPr lang="da-DK" dirty="0"/>
+              <a:t>3)</a:t>
+            </a:r>
+          </a:p>
+          <a:p>
+            <a:r>
+              <a:rPr lang="da-DK" dirty="0"/>
+              <a:t>Deep learning model</a:t>
+            </a:r>
+          </a:p>
+          <a:p>
+            <a:r>
+              <a:rPr lang="da-DK" dirty="0"/>
+              <a:t>Benchmarking</a:t>
+            </a:r>
+          </a:p>
+          <a:p>
+            <a:r>
+              <a:rPr lang="da-DK" dirty="0" err="1"/>
+              <a:t>Results</a:t>
+            </a:r>
+            <a:endParaRPr lang="da-DK" dirty="0"/>
           </a:p>
         </p:txBody>
       </p:sp>
@@ -57388,7 +57534,86 @@
           <a:bodyPr/>
           <a:lstStyle/>
           <a:p>
-            <a:endParaRPr lang="da-DK" dirty="0"/>
+            <a:r>
+              <a:rPr lang="da-DK" b="1" dirty="0"/>
+              <a:t>To </a:t>
+            </a:r>
+            <a:r>
+              <a:rPr lang="da-DK" b="1" dirty="0" err="1"/>
+              <a:t>forecast</a:t>
+            </a:r>
+            <a:r>
+              <a:rPr lang="da-DK" b="1" dirty="0"/>
+              <a:t> </a:t>
+            </a:r>
+            <a:r>
+              <a:rPr lang="da-DK" b="1" dirty="0" err="1"/>
+              <a:t>electricity</a:t>
+            </a:r>
+            <a:r>
+              <a:rPr lang="da-DK" b="1" dirty="0"/>
+              <a:t> </a:t>
+            </a:r>
+            <a:r>
+              <a:rPr lang="da-DK" b="1" dirty="0" err="1"/>
+              <a:t>prices</a:t>
+            </a:r>
+            <a:r>
+              <a:rPr lang="da-DK" b="1" dirty="0"/>
+              <a:t> in </a:t>
+            </a:r>
+            <a:r>
+              <a:rPr lang="da-DK" b="1" dirty="0" err="1"/>
+              <a:t>period</a:t>
+            </a:r>
+            <a:r>
+              <a:rPr lang="da-DK" b="1" dirty="0"/>
+              <a:t> t, </a:t>
+            </a:r>
+            <a:r>
+              <a:rPr lang="da-DK" b="1" dirty="0" err="1"/>
+              <a:t>we</a:t>
+            </a:r>
+            <a:r>
+              <a:rPr lang="da-DK" b="1" dirty="0"/>
+              <a:t> </a:t>
+            </a:r>
+            <a:r>
+              <a:rPr lang="da-DK" b="1" dirty="0" err="1"/>
+              <a:t>use</a:t>
+            </a:r>
+            <a:r>
+              <a:rPr lang="da-DK" b="1" dirty="0"/>
+              <a:t>:</a:t>
+            </a:r>
+          </a:p>
+          <a:p>
+            <a:r>
+              <a:rPr lang="da-DK" dirty="0"/>
+              <a:t>Prices: t-3, t-2, t-1</a:t>
+            </a:r>
+          </a:p>
+          <a:p>
+            <a:r>
+              <a:rPr lang="da-DK" dirty="0"/>
+              <a:t>Sales: t-3, t-2, t-1</a:t>
+            </a:r>
+          </a:p>
+          <a:p>
+            <a:r>
+              <a:rPr lang="da-DK" dirty="0" err="1"/>
+              <a:t>Weather</a:t>
+            </a:r>
+            <a:r>
+              <a:rPr lang="da-DK" dirty="0"/>
+              <a:t>: t-1</a:t>
+            </a:r>
+          </a:p>
+          <a:p>
+            <a:r>
+              <a:rPr lang="da-DK" dirty="0"/>
+              <a:t>GDP: t-1</a:t>
+            </a:r>
           </a:p>
         </p:txBody>
       </p:sp>
@@ -57413,7 +57638,82 @@
           <a:bodyPr/>
           <a:lstStyle/>
           <a:p>
-            <a:endParaRPr lang="da-DK"/>
+            <a:r>
+              <a:rPr lang="da-DK" dirty="0"/>
+              <a:t>Sales </a:t>
+            </a:r>
+            <a:r>
+              <a:rPr lang="da-DK" dirty="0" err="1"/>
+              <a:t>variance</a:t>
+            </a:r>
+            <a:r>
+              <a:rPr lang="da-DK" dirty="0"/>
+              <a:t>, </a:t>
+            </a:r>
+            <a:r>
+              <a:rPr lang="da-DK" dirty="0" err="1"/>
+              <a:t>skewness</a:t>
+            </a:r>
+            <a:r>
+              <a:rPr lang="da-DK" dirty="0"/>
+              <a:t> and </a:t>
+            </a:r>
+            <a:r>
+              <a:rPr lang="da-DK" dirty="0" err="1"/>
+              <a:t>curtosis</a:t>
+            </a:r>
+            <a:endParaRPr lang="da-DK" dirty="0"/>
+          </a:p>
+          <a:p>
+            <a:r>
+              <a:rPr lang="da-DK" dirty="0"/>
+              <a:t>Price </a:t>
+            </a:r>
+            <a:r>
+              <a:rPr lang="da-DK" dirty="0" err="1"/>
+              <a:t>variance</a:t>
+            </a:r>
+            <a:r>
+              <a:rPr lang="da-DK" dirty="0"/>
+              <a:t>, </a:t>
+            </a:r>
+            <a:r>
+              <a:rPr lang="da-DK" dirty="0" err="1"/>
+              <a:t>skewness</a:t>
+            </a:r>
+            <a:r>
+              <a:rPr lang="da-DK" dirty="0"/>
+              <a:t> and </a:t>
+            </a:r>
+            <a:r>
+              <a:rPr lang="da-DK" dirty="0" err="1"/>
+              <a:t>curtosis</a:t>
+            </a:r>
+            <a:endParaRPr lang="da-DK" dirty="0"/>
+          </a:p>
+          <a:p>
+            <a:r>
+              <a:rPr lang="da-DK" dirty="0"/>
+              <a:t>Population in 2013</a:t>
+            </a:r>
+          </a:p>
+          <a:p>
+            <a:r>
+              <a:rPr lang="da-DK" dirty="0" err="1"/>
+              <a:t>Longtitude</a:t>
+            </a:r>
+            <a:r>
+              <a:rPr lang="da-DK" dirty="0"/>
+              <a:t>/</a:t>
+            </a:r>
+            <a:r>
+              <a:rPr lang="da-DK" dirty="0" err="1"/>
+              <a:t>latitude</a:t>
+            </a:r>
+            <a:endParaRPr lang="da-DK" dirty="0"/>
+          </a:p>
+          <a:p>
+            <a:endParaRPr lang="da-DK" dirty="0"/>
           </a:p>
         </p:txBody>
       </p:sp>

</xml_diff>